<commit_message>
Made minor updates to Arrays and Lists power point such as the links to schedule page and syllabus were updated to correct pages
</commit_message>
<xml_diff>
--- a/ClassMaterials/ArraysAndLists/Slides/Arrays and Lists.pptx
+++ b/ClassMaterials/ArraysAndLists/Slides/Arrays and Lists.pptx
@@ -4093,7 +4093,7 @@
           </a:ln>
           <a:extLst>
             <a:ext uri="{C572A759-6A51-4108-AA02-DFA0A04FC94B}">
-              <ma14:wrappingTextBoxFlag xmlns:ma14="http://schemas.microsoft.com/office/mac/drawingml/2011/main" xmlns="" val="1"/>
+              <ma14:wrappingTextBoxFlag xmlns="" xmlns:ma14="http://schemas.microsoft.com/office/mac/drawingml/2011/main" val="1"/>
             </a:ext>
           </a:extLst>
         </p:spPr>
@@ -4136,7 +4136,7 @@
           </a:ln>
           <a:extLst>
             <a:ext uri="{C572A759-6A51-4108-AA02-DFA0A04FC94B}">
-              <ma14:wrappingTextBoxFlag xmlns:ma14="http://schemas.microsoft.com/office/mac/drawingml/2011/main" xmlns="" val="1"/>
+              <ma14:wrappingTextBoxFlag xmlns="" xmlns:ma14="http://schemas.microsoft.com/office/mac/drawingml/2011/main" val="1"/>
             </a:ext>
           </a:extLst>
         </p:spPr>
@@ -4756,7 +4756,7 @@
           </a:ln>
           <a:extLst>
             <a:ext uri="{C572A759-6A51-4108-AA02-DFA0A04FC94B}">
-              <ma14:wrappingTextBoxFlag xmlns:ma14="http://schemas.microsoft.com/office/mac/drawingml/2011/main" xmlns="" val="1"/>
+              <ma14:wrappingTextBoxFlag xmlns="" xmlns:ma14="http://schemas.microsoft.com/office/mac/drawingml/2011/main" val="1"/>
             </a:ext>
           </a:extLst>
         </p:spPr>
@@ -4932,8 +4932,11 @@
               <a:rPr lang="en-US" dirty="0">
                 <a:hlinkClick r:id="rId3"/>
               </a:rPr>
-              <a:t>https://hewner.github.io/csse220/schedule.html</a:t>
-            </a:r>
+              <a:t>https://rhit-csse.github.io/csse220/schedule.html</a:t>
+            </a:r>
+            <a:endParaRPr lang="en-US" dirty="0"/>
+          </a:p>
+          <a:p>
             <a:endParaRPr lang="en-US" dirty="0"/>
           </a:p>
           <a:p>
@@ -6899,7 +6902,7 @@
             <a:effectLst/>
             <a:extLst>
               <a:ext uri="{C572A759-6A51-4108-AA02-DFA0A04FC94B}">
-                <ma14:wrappingTextBoxFlag xmlns:ma14="http://schemas.microsoft.com/office/mac/drawingml/2011/main" xmlns="" val="1"/>
+                <ma14:wrappingTextBoxFlag xmlns="" xmlns:ma14="http://schemas.microsoft.com/office/mac/drawingml/2011/main" val="1"/>
               </a:ext>
             </a:extLst>
           </p:spPr>
@@ -7086,7 +7089,7 @@
             <a:effectLst/>
             <a:extLst>
               <a:ext uri="{C572A759-6A51-4108-AA02-DFA0A04FC94B}">
-                <ma14:wrappingTextBoxFlag xmlns:ma14="http://schemas.microsoft.com/office/mac/drawingml/2011/main" xmlns="" val="1"/>
+                <ma14:wrappingTextBoxFlag xmlns="" xmlns:ma14="http://schemas.microsoft.com/office/mac/drawingml/2011/main" val="1"/>
               </a:ext>
             </a:extLst>
           </p:spPr>
@@ -7682,7 +7685,7 @@
             <a:effectLst/>
             <a:extLst>
               <a:ext uri="{C572A759-6A51-4108-AA02-DFA0A04FC94B}">
-                <ma14:wrappingTextBoxFlag xmlns:ma14="http://schemas.microsoft.com/office/mac/drawingml/2011/main" xmlns="" val="1"/>
+                <ma14:wrappingTextBoxFlag xmlns="" xmlns:ma14="http://schemas.microsoft.com/office/mac/drawingml/2011/main" val="1"/>
               </a:ext>
             </a:extLst>
           </p:spPr>
@@ -7877,7 +7880,7 @@
             <a:effectLst/>
             <a:extLst>
               <a:ext uri="{C572A759-6A51-4108-AA02-DFA0A04FC94B}">
-                <ma14:wrappingTextBoxFlag xmlns:ma14="http://schemas.microsoft.com/office/mac/drawingml/2011/main" xmlns="" val="1"/>
+                <ma14:wrappingTextBoxFlag xmlns="" xmlns:ma14="http://schemas.microsoft.com/office/mac/drawingml/2011/main" val="1"/>
               </a:ext>
             </a:extLst>
           </p:spPr>
@@ -8064,7 +8067,7 @@
             <a:effectLst/>
             <a:extLst>
               <a:ext uri="{C572A759-6A51-4108-AA02-DFA0A04FC94B}">
-                <ma14:wrappingTextBoxFlag xmlns:ma14="http://schemas.microsoft.com/office/mac/drawingml/2011/main" xmlns="" val="1"/>
+                <ma14:wrappingTextBoxFlag xmlns="" xmlns:ma14="http://schemas.microsoft.com/office/mac/drawingml/2011/main" val="1"/>
               </a:ext>
             </a:extLst>
           </p:spPr>
@@ -8852,7 +8855,7 @@
             <a:pPr lvl="1"/>
             <a:r>
               <a:rPr lang="en-US" dirty="0"/>
-              <a:t>Read at Big Java chapters</a:t>
+              <a:t>Read the Big Java chapters</a:t>
             </a:r>
           </a:p>
           <a:p>
@@ -9897,7 +9900,7 @@
               <a:effectLst/>
               <a:extLst>
                 <a:ext uri="{C572A759-6A51-4108-AA02-DFA0A04FC94B}">
-                  <ma14:wrappingTextBoxFlag xmlns:ma14="http://schemas.microsoft.com/office/mac/drawingml/2011/main" xmlns="" val="1"/>
+                  <ma14:wrappingTextBoxFlag xmlns="" xmlns:ma14="http://schemas.microsoft.com/office/mac/drawingml/2011/main" val="1"/>
                 </a:ext>
               </a:extLst>
             </p:spPr>
@@ -10014,7 +10017,7 @@
             <a:effectLst/>
             <a:extLst>
               <a:ext uri="{C572A759-6A51-4108-AA02-DFA0A04FC94B}">
-                <ma14:wrappingTextBoxFlag xmlns:ma14="http://schemas.microsoft.com/office/mac/drawingml/2011/main" xmlns="" val="1"/>
+                <ma14:wrappingTextBoxFlag xmlns="" xmlns:ma14="http://schemas.microsoft.com/office/mac/drawingml/2011/main" val="1"/>
               </a:ext>
             </a:extLst>
           </p:spPr>
@@ -10201,7 +10204,7 @@
             <a:effectLst/>
             <a:extLst>
               <a:ext uri="{C572A759-6A51-4108-AA02-DFA0A04FC94B}">
-                <ma14:wrappingTextBoxFlag xmlns:ma14="http://schemas.microsoft.com/office/mac/drawingml/2011/main" xmlns="" val="1"/>
+                <ma14:wrappingTextBoxFlag xmlns="" xmlns:ma14="http://schemas.microsoft.com/office/mac/drawingml/2011/main" val="1"/>
               </a:ext>
             </a:extLst>
           </p:spPr>
@@ -10388,7 +10391,7 @@
             <a:effectLst/>
             <a:extLst>
               <a:ext uri="{C572A759-6A51-4108-AA02-DFA0A04FC94B}">
-                <ma14:wrappingTextBoxFlag xmlns:ma14="http://schemas.microsoft.com/office/mac/drawingml/2011/main" xmlns="" val="1"/>
+                <ma14:wrappingTextBoxFlag xmlns="" xmlns:ma14="http://schemas.microsoft.com/office/mac/drawingml/2011/main" val="1"/>
               </a:ext>
             </a:extLst>
           </p:spPr>
@@ -14613,7 +14616,7 @@
             <a:effectLst/>
             <a:extLst>
               <a:ext uri="{C572A759-6A51-4108-AA02-DFA0A04FC94B}">
-                <ma14:wrappingTextBoxFlag xmlns:ma14="http://schemas.microsoft.com/office/mac/drawingml/2011/main" xmlns="" val="1"/>
+                <ma14:wrappingTextBoxFlag xmlns="" xmlns:ma14="http://schemas.microsoft.com/office/mac/drawingml/2011/main" val="1"/>
               </a:ext>
             </a:extLst>
           </p:spPr>
@@ -14833,7 +14836,7 @@
             <a:effectLst/>
             <a:extLst>
               <a:ext uri="{C572A759-6A51-4108-AA02-DFA0A04FC94B}">
-                <ma14:wrappingTextBoxFlag xmlns:ma14="http://schemas.microsoft.com/office/mac/drawingml/2011/main" xmlns="" val="1"/>
+                <ma14:wrappingTextBoxFlag xmlns="" xmlns:ma14="http://schemas.microsoft.com/office/mac/drawingml/2011/main" val="1"/>
               </a:ext>
             </a:extLst>
           </p:spPr>
@@ -15995,7 +15998,7 @@
           </a:ln>
           <a:extLst>
             <a:ext uri="{C572A759-6A51-4108-AA02-DFA0A04FC94B}">
-              <ma14:wrappingTextBoxFlag xmlns="" xmlns:ma14="http://schemas.microsoft.com/office/mac/drawingml/2011/main" val="1"/>
+              <ma14:wrappingTextBoxFlag xmlns:ma14="http://schemas.microsoft.com/office/mac/drawingml/2011/main" xmlns="" val="1"/>
             </a:ext>
           </a:extLst>
         </p:spPr>
@@ -16896,9 +16899,12 @@
               <a:rPr lang="en-US" dirty="0">
                 <a:hlinkClick r:id="rId3"/>
               </a:rPr>
-              <a:t>https://hewner.github.io/csse220/Docs/course_policies.html</a:t>
-            </a:r>
-            <a:endParaRPr lang="en-US" dirty="0"/>
+              <a:t>https://github.com/RHIT-CSSE/csse220/blob/master/Docs/course_policies.md</a:t>
+            </a:r>
+            <a:r>
+              <a:rPr lang="en-US" dirty="0"/>
+              <a:t>  (Also on Schedule page, under the first day labeled “Syllabus”)</a:t>
+            </a:r>
           </a:p>
           <a:p>
             <a:pPr lvl="1"/>

</xml_diff>